<commit_message>
MAJ de la présentation (06/01)
</commit_message>
<xml_diff>
--- a/présentation/Présentation IF26.pptx
+++ b/présentation/Présentation IF26.pptx
@@ -5,7 +5,7 @@
     <p:sldMasterId id="2147483696" r:id="rId1"/>
   </p:sldMasterIdLst>
   <p:notesMasterIdLst>
-    <p:notesMasterId r:id="rId14"/>
+    <p:notesMasterId r:id="rId18"/>
   </p:notesMasterIdLst>
   <p:sldIdLst>
     <p:sldId id="256" r:id="rId2"/>
@@ -16,10 +16,14 @@
     <p:sldId id="285" r:id="rId7"/>
     <p:sldId id="279" r:id="rId8"/>
     <p:sldId id="282" r:id="rId9"/>
-    <p:sldId id="280" r:id="rId10"/>
-    <p:sldId id="283" r:id="rId11"/>
-    <p:sldId id="281" r:id="rId12"/>
-    <p:sldId id="284" r:id="rId13"/>
+    <p:sldId id="286" r:id="rId10"/>
+    <p:sldId id="287" r:id="rId11"/>
+    <p:sldId id="288" r:id="rId12"/>
+    <p:sldId id="289" r:id="rId13"/>
+    <p:sldId id="280" r:id="rId14"/>
+    <p:sldId id="283" r:id="rId15"/>
+    <p:sldId id="281" r:id="rId16"/>
+    <p:sldId id="284" r:id="rId17"/>
   </p:sldIdLst>
   <p:sldSz cx="9144000" cy="6858000" type="screen4x3"/>
   <p:notesSz cx="6858000" cy="9144000"/>
@@ -204,7 +208,7 @@
             <a:fld id="{C8A64E49-555C-4914-82C7-78B9263499EB}" type="datetimeFigureOut">
               <a:rPr lang="fr-FR" smtClean="0"/>
               <a:pPr/>
-              <a:t>04/01/2013</a:t>
+              <a:t>06/01/2013</a:t>
             </a:fld>
             <a:endParaRPr lang="fr-FR"/>
           </a:p>
@@ -560,6 +564,145 @@
 </p:notes>
 </file>
 
+<file path=ppt/notesSlides/notesSlide2.xml><?xml version="1.0" encoding="utf-8"?>
+<p:notes xmlns:a="http://schemas.openxmlformats.org/drawingml/2006/main" xmlns:r="http://schemas.openxmlformats.org/officeDocument/2006/relationships" xmlns:p="http://schemas.openxmlformats.org/presentationml/2006/main">
+  <p:cSld>
+    <p:spTree>
+      <p:nvGrpSpPr>
+        <p:cNvPr id="1" name=""/>
+        <p:cNvGrpSpPr/>
+        <p:nvPr/>
+      </p:nvGrpSpPr>
+      <p:grpSpPr>
+        <a:xfrm>
+          <a:off x="0" y="0"/>
+          <a:ext cx="0" cy="0"/>
+          <a:chOff x="0" y="0"/>
+          <a:chExt cx="0" cy="0"/>
+        </a:xfrm>
+      </p:grpSpPr>
+      <p:sp>
+        <p:nvSpPr>
+          <p:cNvPr id="2" name="Espace réservé de l'image des diapositives 1"/>
+          <p:cNvSpPr>
+            <a:spLocks noGrp="1" noRot="1" noChangeAspect="1"/>
+          </p:cNvSpPr>
+          <p:nvPr>
+            <p:ph type="sldImg"/>
+          </p:nvPr>
+        </p:nvSpPr>
+        <p:spPr/>
+      </p:sp>
+      <p:sp>
+        <p:nvSpPr>
+          <p:cNvPr id="3" name="Espace réservé des commentaires 2"/>
+          <p:cNvSpPr>
+            <a:spLocks noGrp="1"/>
+          </p:cNvSpPr>
+          <p:nvPr>
+            <p:ph type="body" idx="1"/>
+          </p:nvPr>
+        </p:nvSpPr>
+        <p:spPr/>
+        <p:txBody>
+          <a:bodyPr/>
+          <a:lstStyle/>
+          <a:p>
+            <a:r>
+              <a:rPr lang="fr-FR" dirty="0" smtClean="0"/>
+              <a:t>La page « ajouter un compte » est trop grande</a:t>
+            </a:r>
+            <a:r>
+              <a:rPr lang="fr-FR" baseline="0" dirty="0" smtClean="0"/>
+              <a:t> pour faire une ‘</a:t>
+            </a:r>
+            <a:r>
+              <a:rPr lang="fr-FR" baseline="0" dirty="0" err="1" smtClean="0"/>
+              <a:t>impécr</a:t>
+            </a:r>
+            <a:r>
+              <a:rPr lang="fr-FR" baseline="0" dirty="0" smtClean="0"/>
+              <a:t> </a:t>
+            </a:r>
+            <a:r>
+              <a:rPr lang="fr-FR" baseline="0" dirty="0" err="1" smtClean="0"/>
+              <a:t>syst</a:t>
+            </a:r>
+            <a:r>
+              <a:rPr lang="fr-FR" baseline="0" dirty="0" smtClean="0"/>
+              <a:t>’, je l’’ai fait directement </a:t>
+            </a:r>
+            <a:r>
+              <a:rPr lang="fr-FR" baseline="0" dirty="0" err="1" smtClean="0"/>
+              <a:t>dy</a:t>
+            </a:r>
+            <a:r>
+              <a:rPr lang="fr-FR" baseline="0" dirty="0" smtClean="0"/>
+              <a:t> fichier html, mais c pas la </a:t>
+            </a:r>
+            <a:r>
+              <a:rPr lang="fr-FR" baseline="0" dirty="0" err="1" smtClean="0"/>
+              <a:t>m^m</a:t>
+            </a:r>
+            <a:r>
+              <a:rPr lang="fr-FR" baseline="0" dirty="0" smtClean="0"/>
+              <a:t> qui figure sur l’application.</a:t>
+            </a:r>
+          </a:p>
+          <a:p>
+            <a:r>
+              <a:rPr lang="fr-FR" baseline="0" dirty="0" smtClean="0"/>
+              <a:t>A voir : </a:t>
+            </a:r>
+            <a:r>
+              <a:rPr lang="fr-FR" baseline="0" dirty="0" err="1" smtClean="0"/>
+              <a:t>ksk’on</a:t>
+            </a:r>
+            <a:r>
+              <a:rPr lang="fr-FR" baseline="0" dirty="0" smtClean="0"/>
+              <a:t> peut faire !</a:t>
+            </a:r>
+            <a:endParaRPr lang="fr-FR" dirty="0"/>
+          </a:p>
+        </p:txBody>
+      </p:sp>
+      <p:sp>
+        <p:nvSpPr>
+          <p:cNvPr id="4" name="Espace réservé du numéro de diapositive 3"/>
+          <p:cNvSpPr>
+            <a:spLocks noGrp="1"/>
+          </p:cNvSpPr>
+          <p:nvPr>
+            <p:ph type="sldNum" sz="quarter" idx="10"/>
+          </p:nvPr>
+        </p:nvSpPr>
+        <p:spPr/>
+        <p:txBody>
+          <a:bodyPr/>
+          <a:lstStyle/>
+          <a:p>
+            <a:fld id="{A45EA1D2-E017-4592-857B-6B17935E7EF0}" type="slidenum">
+              <a:rPr lang="fr-FR" smtClean="0"/>
+              <a:pPr/>
+              <a:t>9</a:t>
+            </a:fld>
+            <a:endParaRPr lang="fr-FR"/>
+          </a:p>
+        </p:txBody>
+      </p:sp>
+    </p:spTree>
+    <p:extLst>
+      <p:ext uri="{BB962C8B-B14F-4D97-AF65-F5344CB8AC3E}">
+        <p14:creationId xmlns:p14="http://schemas.microsoft.com/office/powerpoint/2010/main" val="422403503"/>
+      </p:ext>
+    </p:extLst>
+  </p:cSld>
+  <p:clrMapOvr>
+    <a:masterClrMapping/>
+  </p:clrMapOvr>
+</p:notes>
+</file>
+
 <file path=ppt/slideLayouts/slideLayout1.xml><?xml version="1.0" encoding="utf-8"?>
 <p:sldLayout xmlns:a="http://schemas.openxmlformats.org/drawingml/2006/main" xmlns:r="http://schemas.openxmlformats.org/officeDocument/2006/relationships" xmlns:p="http://schemas.openxmlformats.org/presentationml/2006/main" showMasterSp="0" type="title" preserve="1">
   <p:cSld name="Diapositive de titre">
@@ -1218,7 +1361,7 @@
           <a:p>
             <a:fld id="{F69038DB-DB27-4C81-A99E-EDC406D87CE1}" type="datetime1">
               <a:rPr lang="fr-FR" smtClean="0"/>
-              <a:t>04/01/2013</a:t>
+              <a:t>06/01/2013</a:t>
             </a:fld>
             <a:endParaRPr lang="fr-FR"/>
           </a:p>
@@ -1402,7 +1545,7 @@
           <a:p>
             <a:fld id="{F0571686-CF20-4A0B-8B61-492E3DA4E76D}" type="datetime1">
               <a:rPr lang="fr-FR" smtClean="0"/>
-              <a:t>04/01/2013</a:t>
+              <a:t>06/01/2013</a:t>
             </a:fld>
             <a:endParaRPr lang="fr-FR"/>
           </a:p>
@@ -1578,7 +1721,7 @@
           <a:p>
             <a:fld id="{7C75FE9E-1F1B-474D-87DD-E94BF53DF9B2}" type="datetime1">
               <a:rPr lang="fr-FR" smtClean="0"/>
-              <a:t>04/01/2013</a:t>
+              <a:t>06/01/2013</a:t>
             </a:fld>
             <a:endParaRPr lang="fr-FR"/>
           </a:p>
@@ -1744,7 +1887,7 @@
           <a:p>
             <a:fld id="{6ED2B56A-06DF-46AA-AE22-01555B55BA06}" type="datetime1">
               <a:rPr lang="fr-FR" smtClean="0"/>
-              <a:t>04/01/2013</a:t>
+              <a:t>06/01/2013</a:t>
             </a:fld>
             <a:endParaRPr lang="fr-FR"/>
           </a:p>
@@ -1966,7 +2109,7 @@
           <a:p>
             <a:fld id="{9CDBD0C8-D033-408A-BB9E-47E89B01D8DF}" type="datetime1">
               <a:rPr lang="fr-FR" smtClean="0"/>
-              <a:t>04/01/2013</a:t>
+              <a:t>06/01/2013</a:t>
             </a:fld>
             <a:endParaRPr lang="fr-FR"/>
           </a:p>
@@ -2226,7 +2369,7 @@
           <a:p>
             <a:fld id="{06F6D62E-40AD-46AA-9570-BB67791276A8}" type="datetime1">
               <a:rPr lang="fr-FR" smtClean="0"/>
-              <a:t>04/01/2013</a:t>
+              <a:t>06/01/2013</a:t>
             </a:fld>
             <a:endParaRPr lang="fr-FR"/>
           </a:p>
@@ -2631,7 +2774,7 @@
           <a:p>
             <a:fld id="{5B990584-B0F5-4C80-8615-63F6B6650DAA}" type="datetime1">
               <a:rPr lang="fr-FR" smtClean="0"/>
-              <a:t>04/01/2013</a:t>
+              <a:t>06/01/2013</a:t>
             </a:fld>
             <a:endParaRPr lang="fr-FR"/>
           </a:p>
@@ -2763,7 +2906,7 @@
           <a:p>
             <a:fld id="{67097661-A49E-4A2A-AE45-1694091695EA}" type="datetime1">
               <a:rPr lang="fr-FR" smtClean="0"/>
-              <a:t>04/01/2013</a:t>
+              <a:t>06/01/2013</a:t>
             </a:fld>
             <a:endParaRPr lang="fr-FR"/>
           </a:p>
@@ -2864,7 +3007,7 @@
           <a:p>
             <a:fld id="{AAF7C268-C145-4C2F-8577-BD5E667C29C1}" type="datetime1">
               <a:rPr lang="fr-FR" smtClean="0"/>
-              <a:t>04/01/2013</a:t>
+              <a:t>06/01/2013</a:t>
             </a:fld>
             <a:endParaRPr lang="fr-FR"/>
           </a:p>
@@ -3110,7 +3253,7 @@
           <a:p>
             <a:fld id="{1DCEBBFF-8C8A-4EA2-A070-C25A10008A17}" type="datetime1">
               <a:rPr lang="fr-FR" smtClean="0"/>
-              <a:t>04/01/2013</a:t>
+              <a:t>06/01/2013</a:t>
             </a:fld>
             <a:endParaRPr lang="fr-FR"/>
           </a:p>
@@ -3355,7 +3498,7 @@
           <a:p>
             <a:fld id="{292C543B-154D-4461-A8A8-30F5B7DCFC53}" type="datetime1">
               <a:rPr lang="fr-FR" smtClean="0"/>
-              <a:t>04/01/2013</a:t>
+              <a:t>06/01/2013</a:t>
             </a:fld>
             <a:endParaRPr lang="fr-FR"/>
           </a:p>
@@ -4180,7 +4323,7 @@
           <a:p>
             <a:fld id="{2AFD231C-2EC0-461A-BD1C-387FB840F521}" type="datetime1">
               <a:rPr lang="fr-FR" smtClean="0"/>
-              <a:t>04/01/2013</a:t>
+              <a:t>06/01/2013</a:t>
             </a:fld>
             <a:endParaRPr lang="fr-FR"/>
           </a:p>
@@ -4721,7 +4864,29 @@
                 </a:solidFill>
                 <a:latin typeface="+mj-lt"/>
               </a:rPr>
-              <a:t>Présentation  de l’architecture générale de l’application </a:t>
+              <a:t>Présentation </a:t>
+            </a:r>
+            <a:r>
+              <a:rPr lang="fr-FR" sz="2000" b="1" dirty="0" smtClean="0">
+                <a:solidFill>
+                  <a:schemeClr val="tx2">
+                    <a:lumMod val="75000"/>
+                  </a:schemeClr>
+                </a:solidFill>
+                <a:latin typeface="+mj-lt"/>
+              </a:rPr>
+              <a:t>de </a:t>
+            </a:r>
+            <a:r>
+              <a:rPr lang="fr-FR" sz="2000" b="1" dirty="0" smtClean="0">
+                <a:solidFill>
+                  <a:schemeClr val="tx2">
+                    <a:lumMod val="75000"/>
+                  </a:schemeClr>
+                </a:solidFill>
+                <a:latin typeface="+mj-lt"/>
+              </a:rPr>
+              <a:t>l’architecture générale de l’application </a:t>
             </a:r>
             <a:endParaRPr lang="fr-FR" sz="2000" b="1" dirty="0">
               <a:solidFill>
@@ -5003,44 +5168,6 @@
       </p:grpSpPr>
       <p:sp>
         <p:nvSpPr>
-          <p:cNvPr id="2" name="Titre 1"/>
-          <p:cNvSpPr>
-            <a:spLocks noGrp="1"/>
-          </p:cNvSpPr>
-          <p:nvPr>
-            <p:ph type="title"/>
-          </p:nvPr>
-        </p:nvSpPr>
-        <p:spPr/>
-        <p:txBody>
-          <a:bodyPr/>
-          <a:lstStyle/>
-          <a:p>
-            <a:endParaRPr lang="fr-FR"/>
-          </a:p>
-        </p:txBody>
-      </p:sp>
-      <p:sp>
-        <p:nvSpPr>
-          <p:cNvPr id="3" name="Espace réservé du contenu 2"/>
-          <p:cNvSpPr>
-            <a:spLocks noGrp="1"/>
-          </p:cNvSpPr>
-          <p:nvPr>
-            <p:ph idx="1"/>
-          </p:nvPr>
-        </p:nvSpPr>
-        <p:spPr/>
-        <p:txBody>
-          <a:bodyPr/>
-          <a:lstStyle/>
-          <a:p>
-            <a:endParaRPr lang="fr-FR"/>
-          </a:p>
-        </p:txBody>
-      </p:sp>
-      <p:sp>
-        <p:nvSpPr>
           <p:cNvPr id="4" name="Espace réservé du numéro de diapositive 3"/>
           <p:cNvSpPr>
             <a:spLocks noGrp="1"/>
@@ -5063,16 +5190,233 @@
           </a:p>
         </p:txBody>
       </p:sp>
+      <p:sp>
+        <p:nvSpPr>
+          <p:cNvPr id="5" name="Rectangle à coins arrondis 4"/>
+          <p:cNvSpPr/>
+          <p:nvPr/>
+        </p:nvSpPr>
+        <p:spPr>
+          <a:xfrm>
+            <a:off x="72008" y="548680"/>
+            <a:ext cx="7524328" cy="504056"/>
+          </a:xfrm>
+          <a:prstGeom prst="roundRect">
+            <a:avLst/>
+          </a:prstGeom>
+          <a:solidFill>
+            <a:schemeClr val="bg1"/>
+          </a:solidFill>
+          <a:ln w="38100">
+            <a:solidFill>
+              <a:schemeClr val="tx1"/>
+            </a:solidFill>
+          </a:ln>
+        </p:spPr>
+        <p:style>
+          <a:lnRef idx="2">
+            <a:schemeClr val="accent1">
+              <a:shade val="50000"/>
+            </a:schemeClr>
+          </a:lnRef>
+          <a:fillRef idx="1">
+            <a:schemeClr val="accent1"/>
+          </a:fillRef>
+          <a:effectRef idx="0">
+            <a:schemeClr val="accent1"/>
+          </a:effectRef>
+          <a:fontRef idx="minor">
+            <a:schemeClr val="lt1"/>
+          </a:fontRef>
+        </p:style>
+        <p:txBody>
+          <a:bodyPr rtlCol="0" anchor="ctr"/>
+          <a:lstStyle/>
+          <a:p>
+            <a:r>
+              <a:rPr lang="fr-FR" sz="2000" b="1" dirty="0">
+                <a:solidFill>
+                  <a:srgbClr val="002060"/>
+                </a:solidFill>
+              </a:rPr>
+              <a:t>Architecture générale de l’application</a:t>
+            </a:r>
+          </a:p>
+        </p:txBody>
+      </p:sp>
+      <p:sp>
+        <p:nvSpPr>
+          <p:cNvPr id="6" name="Rectangle à coins arrondis 5"/>
+          <p:cNvSpPr/>
+          <p:nvPr/>
+        </p:nvSpPr>
+        <p:spPr>
+          <a:xfrm>
+            <a:off x="107504" y="1196752"/>
+            <a:ext cx="1944216" cy="432048"/>
+          </a:xfrm>
+          <a:prstGeom prst="roundRect">
+            <a:avLst/>
+          </a:prstGeom>
+          <a:solidFill>
+            <a:schemeClr val="bg1"/>
+          </a:solidFill>
+          <a:ln w="38100">
+            <a:solidFill>
+              <a:schemeClr val="accent6">
+                <a:lumMod val="60000"/>
+                <a:lumOff val="40000"/>
+              </a:schemeClr>
+            </a:solidFill>
+          </a:ln>
+        </p:spPr>
+        <p:style>
+          <a:lnRef idx="2">
+            <a:schemeClr val="accent1">
+              <a:shade val="50000"/>
+            </a:schemeClr>
+          </a:lnRef>
+          <a:fillRef idx="1">
+            <a:schemeClr val="accent1"/>
+          </a:fillRef>
+          <a:effectRef idx="0">
+            <a:schemeClr val="accent1"/>
+          </a:effectRef>
+          <a:fontRef idx="minor">
+            <a:schemeClr val="lt1"/>
+          </a:fontRef>
+        </p:style>
+        <p:txBody>
+          <a:bodyPr rtlCol="0" anchor="ctr"/>
+          <a:lstStyle/>
+          <a:p>
+            <a:r>
+              <a:rPr lang="fr-FR" sz="2400" dirty="0">
+                <a:solidFill>
+                  <a:schemeClr val="accent2">
+                    <a:lumMod val="75000"/>
+                  </a:schemeClr>
+                </a:solidFill>
+              </a:rPr>
+              <a:t>Partie client</a:t>
+            </a:r>
+            <a:endParaRPr lang="fr-FR" sz="2200" b="1" dirty="0">
+              <a:solidFill>
+                <a:schemeClr val="accent2">
+                  <a:lumMod val="75000"/>
+                </a:schemeClr>
+              </a:solidFill>
+            </a:endParaRPr>
+          </a:p>
+        </p:txBody>
+      </p:sp>
+      <p:pic>
+        <p:nvPicPr>
+          <p:cNvPr id="7" name="Image 6"/>
+          <p:cNvPicPr>
+            <a:picLocks noChangeAspect="1"/>
+          </p:cNvPicPr>
+          <p:nvPr/>
+        </p:nvPicPr>
+        <p:blipFill>
+          <a:blip r:embed="rId2">
+            <a:extLst>
+              <a:ext uri="{28A0092B-C50C-407E-A947-70E740481C1C}">
+                <a14:useLocalDpi xmlns:a14="http://schemas.microsoft.com/office/drawing/2010/main" val="0"/>
+              </a:ext>
+            </a:extLst>
+          </a:blip>
+          <a:stretch>
+            <a:fillRect/>
+          </a:stretch>
+        </p:blipFill>
+        <p:spPr>
+          <a:xfrm>
+            <a:off x="2826640" y="1412776"/>
+            <a:ext cx="2934110" cy="504896"/>
+          </a:xfrm>
+          <a:prstGeom prst="rect">
+            <a:avLst/>
+          </a:prstGeom>
+        </p:spPr>
+      </p:pic>
+      <p:pic>
+        <p:nvPicPr>
+          <p:cNvPr id="9" name="Image 8"/>
+          <p:cNvPicPr>
+            <a:picLocks noChangeAspect="1"/>
+          </p:cNvPicPr>
+          <p:nvPr/>
+        </p:nvPicPr>
+        <p:blipFill>
+          <a:blip r:embed="rId3">
+            <a:extLst>
+              <a:ext uri="{28A0092B-C50C-407E-A947-70E740481C1C}">
+                <a14:useLocalDpi xmlns:a14="http://schemas.microsoft.com/office/drawing/2010/main" val="0"/>
+              </a:ext>
+            </a:extLst>
+          </a:blip>
+          <a:stretch>
+            <a:fillRect/>
+          </a:stretch>
+        </p:blipFill>
+        <p:spPr>
+          <a:xfrm>
+            <a:off x="573757" y="1988840"/>
+            <a:ext cx="3029373" cy="4363059"/>
+          </a:xfrm>
+          <a:prstGeom prst="rect">
+            <a:avLst/>
+          </a:prstGeom>
+        </p:spPr>
+      </p:pic>
+      <p:pic>
+        <p:nvPicPr>
+          <p:cNvPr id="10" name="Image 9"/>
+          <p:cNvPicPr>
+            <a:picLocks noChangeAspect="1"/>
+          </p:cNvPicPr>
+          <p:nvPr/>
+        </p:nvPicPr>
+        <p:blipFill>
+          <a:blip r:embed="rId4">
+            <a:extLst>
+              <a:ext uri="{28A0092B-C50C-407E-A947-70E740481C1C}">
+                <a14:useLocalDpi xmlns:a14="http://schemas.microsoft.com/office/drawing/2010/main" val="0"/>
+              </a:ext>
+            </a:extLst>
+          </a:blip>
+          <a:stretch>
+            <a:fillRect/>
+          </a:stretch>
+        </p:blipFill>
+        <p:spPr>
+          <a:xfrm>
+            <a:off x="5148064" y="1988840"/>
+            <a:ext cx="3000794" cy="4267796"/>
+          </a:xfrm>
+          <a:prstGeom prst="rect">
+            <a:avLst/>
+          </a:prstGeom>
+        </p:spPr>
+      </p:pic>
     </p:spTree>
     <p:extLst>
       <p:ext uri="{BB962C8B-B14F-4D97-AF65-F5344CB8AC3E}">
-        <p14:creationId xmlns:p14="http://schemas.microsoft.com/office/powerpoint/2010/main" val="2931599380"/>
+        <p14:creationId xmlns:p14="http://schemas.microsoft.com/office/powerpoint/2010/main" val="305100200"/>
       </p:ext>
     </p:extLst>
   </p:cSld>
   <p:clrMapOvr>
     <a:masterClrMapping/>
   </p:clrMapOvr>
+  <p:timing>
+    <p:tnLst>
+      <p:par>
+        <p:cTn id="1" dur="indefinite" restart="never" nodeType="tmRoot"/>
+      </p:par>
+    </p:tnLst>
+  </p:timing>
 </p:sld>
 </file>
 
@@ -5125,8 +5469,8 @@
         </p:nvSpPr>
         <p:spPr>
           <a:xfrm>
-            <a:off x="251520" y="3140968"/>
-            <a:ext cx="8640960" cy="936104"/>
+            <a:off x="72008" y="548680"/>
+            <a:ext cx="7524328" cy="504056"/>
           </a:xfrm>
           <a:prstGeom prst="roundRect">
             <a:avLst/>
@@ -5134,7 +5478,7 @@
           <a:solidFill>
             <a:schemeClr val="bg1"/>
           </a:solidFill>
-          <a:ln w="57150">
+          <a:ln w="38100">
             <a:solidFill>
               <a:schemeClr val="tx1"/>
             </a:solidFill>
@@ -5160,20 +5504,119 @@
           <a:bodyPr rtlCol="0" anchor="ctr"/>
           <a:lstStyle/>
           <a:p>
-            <a:pPr algn="ctr"/>
-            <a:r>
-              <a:rPr lang="fr-FR" sz="3600" b="1" dirty="0">
+            <a:r>
+              <a:rPr lang="fr-FR" sz="2000" b="1" dirty="0">
                 <a:solidFill>
                   <a:srgbClr val="002060"/>
                 </a:solidFill>
               </a:rPr>
-              <a:t>Conclusion</a:t>
-            </a:r>
-            <a:endParaRPr lang="fr-FR" sz="3500" b="1" dirty="0">
+              <a:t>Architecture générale de l’application</a:t>
+            </a:r>
+          </a:p>
+        </p:txBody>
+      </p:sp>
+      <p:pic>
+        <p:nvPicPr>
+          <p:cNvPr id="7" name="Image 6"/>
+          <p:cNvPicPr>
+            <a:picLocks noChangeAspect="1"/>
+          </p:cNvPicPr>
+          <p:nvPr/>
+        </p:nvPicPr>
+        <p:blipFill>
+          <a:blip r:embed="rId2">
+            <a:extLst>
+              <a:ext uri="{28A0092B-C50C-407E-A947-70E740481C1C}">
+                <a14:useLocalDpi xmlns:a14="http://schemas.microsoft.com/office/drawing/2010/main" val="0"/>
+              </a:ext>
+            </a:extLst>
+          </a:blip>
+          <a:stretch>
+            <a:fillRect/>
+          </a:stretch>
+        </p:blipFill>
+        <p:spPr>
+          <a:xfrm>
+            <a:off x="1522208" y="3356992"/>
+            <a:ext cx="2934110" cy="504896"/>
+          </a:xfrm>
+          <a:prstGeom prst="rect">
+            <a:avLst/>
+          </a:prstGeom>
+        </p:spPr>
+      </p:pic>
+      <p:sp>
+        <p:nvSpPr>
+          <p:cNvPr id="8" name="Rectangle à coins arrondis 7"/>
+          <p:cNvSpPr/>
+          <p:nvPr/>
+        </p:nvSpPr>
+        <p:spPr>
+          <a:xfrm>
+            <a:off x="107504" y="1196752"/>
+            <a:ext cx="2448272" cy="432048"/>
+          </a:xfrm>
+          <a:prstGeom prst="roundRect">
+            <a:avLst/>
+          </a:prstGeom>
+          <a:solidFill>
+            <a:schemeClr val="bg1"/>
+          </a:solidFill>
+          <a:ln w="38100">
+            <a:solidFill>
+              <a:schemeClr val="accent6">
+                <a:lumMod val="60000"/>
+                <a:lumOff val="40000"/>
+              </a:schemeClr>
+            </a:solidFill>
+          </a:ln>
+        </p:spPr>
+        <p:style>
+          <a:lnRef idx="2">
+            <a:schemeClr val="accent1">
+              <a:shade val="50000"/>
+            </a:schemeClr>
+          </a:lnRef>
+          <a:fillRef idx="1">
+            <a:schemeClr val="accent1"/>
+          </a:fillRef>
+          <a:effectRef idx="0">
+            <a:schemeClr val="accent1"/>
+          </a:effectRef>
+          <a:fontRef idx="minor">
+            <a:schemeClr val="lt1"/>
+          </a:fontRef>
+        </p:style>
+        <p:txBody>
+          <a:bodyPr rtlCol="0" anchor="ctr"/>
+          <a:lstStyle/>
+          <a:p>
+            <a:r>
+              <a:rPr lang="fr-FR" sz="2400" dirty="0">
+                <a:solidFill>
+                  <a:schemeClr val="accent2">
+                    <a:lumMod val="75000"/>
+                  </a:schemeClr>
+                </a:solidFill>
+              </a:rPr>
+              <a:t>Partie </a:t>
+            </a:r>
+            <a:r>
+              <a:rPr lang="fr-FR" sz="2400" dirty="0" smtClean="0">
+                <a:solidFill>
+                  <a:schemeClr val="accent2">
+                    <a:lumMod val="75000"/>
+                  </a:schemeClr>
+                </a:solidFill>
+              </a:rPr>
+              <a:t>Serveur</a:t>
+            </a:r>
+            <a:endParaRPr lang="fr-FR" sz="2200" b="1" dirty="0">
               <a:solidFill>
-                <a:srgbClr val="002060"/>
+                <a:schemeClr val="accent2">
+                  <a:lumMod val="75000"/>
+                </a:schemeClr>
               </a:solidFill>
-              <a:latin typeface="+mj-lt"/>
             </a:endParaRPr>
           </a:p>
         </p:txBody>
@@ -5181,7 +5624,7 @@
     </p:spTree>
     <p:extLst>
       <p:ext uri="{BB962C8B-B14F-4D97-AF65-F5344CB8AC3E}">
-        <p14:creationId xmlns:p14="http://schemas.microsoft.com/office/powerpoint/2010/main" val="51642217"/>
+        <p14:creationId xmlns:p14="http://schemas.microsoft.com/office/powerpoint/2010/main" val="1007114083"/>
       </p:ext>
     </p:extLst>
   </p:cSld>
@@ -5217,44 +5660,6 @@
       </p:grpSpPr>
       <p:sp>
         <p:nvSpPr>
-          <p:cNvPr id="2" name="Titre 1"/>
-          <p:cNvSpPr>
-            <a:spLocks noGrp="1"/>
-          </p:cNvSpPr>
-          <p:nvPr>
-            <p:ph type="title"/>
-          </p:nvPr>
-        </p:nvSpPr>
-        <p:spPr/>
-        <p:txBody>
-          <a:bodyPr/>
-          <a:lstStyle/>
-          <a:p>
-            <a:endParaRPr lang="fr-FR"/>
-          </a:p>
-        </p:txBody>
-      </p:sp>
-      <p:sp>
-        <p:nvSpPr>
-          <p:cNvPr id="3" name="Espace réservé du contenu 2"/>
-          <p:cNvSpPr>
-            <a:spLocks noGrp="1"/>
-          </p:cNvSpPr>
-          <p:nvPr>
-            <p:ph idx="1"/>
-          </p:nvPr>
-        </p:nvSpPr>
-        <p:spPr/>
-        <p:txBody>
-          <a:bodyPr/>
-          <a:lstStyle/>
-          <a:p>
-            <a:endParaRPr lang="fr-FR"/>
-          </a:p>
-        </p:txBody>
-      </p:sp>
-      <p:sp>
-        <p:nvSpPr>
           <p:cNvPr id="4" name="Espace réservé du numéro de diapositive 3"/>
           <p:cNvSpPr>
             <a:spLocks noGrp="1"/>
@@ -5272,6 +5677,630 @@
               <a:rPr lang="fr-FR" smtClean="0"/>
               <a:pPr/>
               <a:t>12</a:t>
+            </a:fld>
+            <a:endParaRPr lang="fr-FR"/>
+          </a:p>
+        </p:txBody>
+      </p:sp>
+      <p:sp>
+        <p:nvSpPr>
+          <p:cNvPr id="5" name="Rectangle à coins arrondis 4"/>
+          <p:cNvSpPr/>
+          <p:nvPr/>
+        </p:nvSpPr>
+        <p:spPr>
+          <a:xfrm>
+            <a:off x="72008" y="548680"/>
+            <a:ext cx="7524328" cy="504056"/>
+          </a:xfrm>
+          <a:prstGeom prst="roundRect">
+            <a:avLst/>
+          </a:prstGeom>
+          <a:solidFill>
+            <a:schemeClr val="bg1"/>
+          </a:solidFill>
+          <a:ln w="38100">
+            <a:solidFill>
+              <a:schemeClr val="tx1"/>
+            </a:solidFill>
+          </a:ln>
+        </p:spPr>
+        <p:style>
+          <a:lnRef idx="2">
+            <a:schemeClr val="accent1">
+              <a:shade val="50000"/>
+            </a:schemeClr>
+          </a:lnRef>
+          <a:fillRef idx="1">
+            <a:schemeClr val="accent1"/>
+          </a:fillRef>
+          <a:effectRef idx="0">
+            <a:schemeClr val="accent1"/>
+          </a:effectRef>
+          <a:fontRef idx="minor">
+            <a:schemeClr val="lt1"/>
+          </a:fontRef>
+        </p:style>
+        <p:txBody>
+          <a:bodyPr rtlCol="0" anchor="ctr"/>
+          <a:lstStyle/>
+          <a:p>
+            <a:r>
+              <a:rPr lang="fr-FR" sz="2000" b="1" dirty="0">
+                <a:solidFill>
+                  <a:srgbClr val="002060"/>
+                </a:solidFill>
+              </a:rPr>
+              <a:t>Architecture générale de l’application</a:t>
+            </a:r>
+          </a:p>
+        </p:txBody>
+      </p:sp>
+      <p:sp>
+        <p:nvSpPr>
+          <p:cNvPr id="7" name="Rectangle à coins arrondis 6"/>
+          <p:cNvSpPr/>
+          <p:nvPr/>
+        </p:nvSpPr>
+        <p:spPr>
+          <a:xfrm>
+            <a:off x="72008" y="1340768"/>
+            <a:ext cx="3542849" cy="432048"/>
+          </a:xfrm>
+          <a:prstGeom prst="roundRect">
+            <a:avLst/>
+          </a:prstGeom>
+          <a:solidFill>
+            <a:schemeClr val="bg1"/>
+          </a:solidFill>
+          <a:ln w="38100">
+            <a:solidFill>
+              <a:schemeClr val="accent6">
+                <a:lumMod val="60000"/>
+                <a:lumOff val="40000"/>
+              </a:schemeClr>
+            </a:solidFill>
+          </a:ln>
+        </p:spPr>
+        <p:style>
+          <a:lnRef idx="2">
+            <a:schemeClr val="accent1">
+              <a:shade val="50000"/>
+            </a:schemeClr>
+          </a:lnRef>
+          <a:fillRef idx="1">
+            <a:schemeClr val="accent1"/>
+          </a:fillRef>
+          <a:effectRef idx="0">
+            <a:schemeClr val="accent1"/>
+          </a:effectRef>
+          <a:fontRef idx="minor">
+            <a:schemeClr val="lt1"/>
+          </a:fontRef>
+        </p:style>
+        <p:txBody>
+          <a:bodyPr rtlCol="0" anchor="ctr"/>
+          <a:lstStyle/>
+          <a:p>
+            <a:pPr marL="681228" indent="-571500">
+              <a:buNone/>
+            </a:pPr>
+            <a:r>
+              <a:rPr lang="fr-FR" sz="2400" dirty="0">
+                <a:solidFill>
+                  <a:schemeClr val="accent2">
+                    <a:lumMod val="75000"/>
+                  </a:schemeClr>
+                </a:solidFill>
+              </a:rPr>
+              <a:t>Solutions proposées</a:t>
+            </a:r>
+            <a:endParaRPr lang="fr-FR" sz="2400" dirty="0">
+              <a:solidFill>
+                <a:schemeClr val="accent2">
+                  <a:lumMod val="75000"/>
+                </a:schemeClr>
+              </a:solidFill>
+            </a:endParaRPr>
+          </a:p>
+        </p:txBody>
+      </p:sp>
+      <p:sp>
+        <p:nvSpPr>
+          <p:cNvPr id="8" name="Rectangle 7"/>
+          <p:cNvSpPr/>
+          <p:nvPr/>
+        </p:nvSpPr>
+        <p:spPr>
+          <a:xfrm>
+            <a:off x="862176" y="2708920"/>
+            <a:ext cx="970137" cy="369332"/>
+          </a:xfrm>
+          <a:prstGeom prst="rect">
+            <a:avLst/>
+          </a:prstGeom>
+        </p:spPr>
+        <p:txBody>
+          <a:bodyPr wrap="none">
+            <a:spAutoFit/>
+          </a:bodyPr>
+          <a:lstStyle/>
+          <a:p>
+            <a:r>
+              <a:rPr lang="fr-FR" dirty="0"/>
+              <a:t>A Voir !</a:t>
+            </a:r>
+            <a:endParaRPr lang="fr-FR" dirty="0"/>
+          </a:p>
+        </p:txBody>
+      </p:sp>
+    </p:spTree>
+    <p:extLst>
+      <p:ext uri="{BB962C8B-B14F-4D97-AF65-F5344CB8AC3E}">
+        <p14:creationId xmlns:p14="http://schemas.microsoft.com/office/powerpoint/2010/main" val="3371579017"/>
+      </p:ext>
+    </p:extLst>
+  </p:cSld>
+  <p:clrMapOvr>
+    <a:masterClrMapping/>
+  </p:clrMapOvr>
+  <p:timing>
+    <p:tnLst>
+      <p:par>
+        <p:cTn id="1" dur="indefinite" restart="never" nodeType="tmRoot"/>
+      </p:par>
+    </p:tnLst>
+  </p:timing>
+</p:sld>
+</file>
+
+<file path=ppt/slides/slide13.xml><?xml version="1.0" encoding="utf-8"?>
+<p:sld xmlns:a="http://schemas.openxmlformats.org/drawingml/2006/main" xmlns:r="http://schemas.openxmlformats.org/officeDocument/2006/relationships" xmlns:p="http://schemas.openxmlformats.org/presentationml/2006/main">
+  <p:cSld>
+    <p:spTree>
+      <p:nvGrpSpPr>
+        <p:cNvPr id="1" name=""/>
+        <p:cNvGrpSpPr/>
+        <p:nvPr/>
+      </p:nvGrpSpPr>
+      <p:grpSpPr>
+        <a:xfrm>
+          <a:off x="0" y="0"/>
+          <a:ext cx="0" cy="0"/>
+          <a:chOff x="0" y="0"/>
+          <a:chExt cx="0" cy="0"/>
+        </a:xfrm>
+      </p:grpSpPr>
+      <p:sp>
+        <p:nvSpPr>
+          <p:cNvPr id="4" name="Espace réservé du numéro de diapositive 3"/>
+          <p:cNvSpPr>
+            <a:spLocks noGrp="1"/>
+          </p:cNvSpPr>
+          <p:nvPr>
+            <p:ph type="sldNum" sz="quarter" idx="12"/>
+          </p:nvPr>
+        </p:nvSpPr>
+        <p:spPr/>
+        <p:txBody>
+          <a:bodyPr/>
+          <a:lstStyle/>
+          <a:p>
+            <a:fld id="{6816B381-CB31-4B8E-B307-29C9C96A0920}" type="slidenum">
+              <a:rPr lang="fr-FR" smtClean="0"/>
+              <a:pPr/>
+              <a:t>13</a:t>
+            </a:fld>
+            <a:endParaRPr lang="fr-FR"/>
+          </a:p>
+        </p:txBody>
+      </p:sp>
+      <p:sp>
+        <p:nvSpPr>
+          <p:cNvPr id="5" name="Rectangle à coins arrondis 4"/>
+          <p:cNvSpPr/>
+          <p:nvPr/>
+        </p:nvSpPr>
+        <p:spPr>
+          <a:xfrm>
+            <a:off x="251520" y="3140968"/>
+            <a:ext cx="8640960" cy="936104"/>
+          </a:xfrm>
+          <a:prstGeom prst="roundRect">
+            <a:avLst/>
+          </a:prstGeom>
+          <a:solidFill>
+            <a:schemeClr val="bg1"/>
+          </a:solidFill>
+          <a:ln w="57150">
+            <a:solidFill>
+              <a:schemeClr val="tx1"/>
+            </a:solidFill>
+          </a:ln>
+        </p:spPr>
+        <p:style>
+          <a:lnRef idx="2">
+            <a:schemeClr val="accent1">
+              <a:shade val="50000"/>
+            </a:schemeClr>
+          </a:lnRef>
+          <a:fillRef idx="1">
+            <a:schemeClr val="accent1"/>
+          </a:fillRef>
+          <a:effectRef idx="0">
+            <a:schemeClr val="accent1"/>
+          </a:effectRef>
+          <a:fontRef idx="minor">
+            <a:schemeClr val="lt1"/>
+          </a:fontRef>
+        </p:style>
+        <p:txBody>
+          <a:bodyPr rtlCol="0" anchor="ctr"/>
+          <a:lstStyle/>
+          <a:p>
+            <a:pPr algn="ctr"/>
+            <a:r>
+              <a:rPr lang="fr-FR" sz="3600" b="1" dirty="0">
+                <a:solidFill>
+                  <a:srgbClr val="002060"/>
+                </a:solidFill>
+              </a:rPr>
+              <a:t>Prévention des failles de sécurité</a:t>
+            </a:r>
+            <a:endParaRPr lang="fr-FR" sz="3500" b="1" dirty="0">
+              <a:solidFill>
+                <a:srgbClr val="002060"/>
+              </a:solidFill>
+              <a:latin typeface="+mj-lt"/>
+            </a:endParaRPr>
+          </a:p>
+        </p:txBody>
+      </p:sp>
+    </p:spTree>
+    <p:extLst>
+      <p:ext uri="{BB962C8B-B14F-4D97-AF65-F5344CB8AC3E}">
+        <p14:creationId xmlns:p14="http://schemas.microsoft.com/office/powerpoint/2010/main" val="51642217"/>
+      </p:ext>
+    </p:extLst>
+  </p:cSld>
+  <p:clrMapOvr>
+    <a:masterClrMapping/>
+  </p:clrMapOvr>
+  <p:timing>
+    <p:tnLst>
+      <p:par>
+        <p:cTn id="1" dur="indefinite" restart="never" nodeType="tmRoot"/>
+      </p:par>
+    </p:tnLst>
+  </p:timing>
+</p:sld>
+</file>
+
+<file path=ppt/slides/slide14.xml><?xml version="1.0" encoding="utf-8"?>
+<p:sld xmlns:a="http://schemas.openxmlformats.org/drawingml/2006/main" xmlns:r="http://schemas.openxmlformats.org/officeDocument/2006/relationships" xmlns:p="http://schemas.openxmlformats.org/presentationml/2006/main">
+  <p:cSld>
+    <p:spTree>
+      <p:nvGrpSpPr>
+        <p:cNvPr id="1" name=""/>
+        <p:cNvGrpSpPr/>
+        <p:nvPr/>
+      </p:nvGrpSpPr>
+      <p:grpSpPr>
+        <a:xfrm>
+          <a:off x="0" y="0"/>
+          <a:ext cx="0" cy="0"/>
+          <a:chOff x="0" y="0"/>
+          <a:chExt cx="0" cy="0"/>
+        </a:xfrm>
+      </p:grpSpPr>
+      <p:sp>
+        <p:nvSpPr>
+          <p:cNvPr id="7" name="Espace réservé du contenu 6"/>
+          <p:cNvSpPr>
+            <a:spLocks noGrp="1"/>
+          </p:cNvSpPr>
+          <p:nvPr>
+            <p:ph idx="1"/>
+          </p:nvPr>
+        </p:nvSpPr>
+        <p:spPr/>
+        <p:txBody>
+          <a:bodyPr/>
+          <a:lstStyle/>
+          <a:p>
+            <a:r>
+              <a:rPr lang="fr-FR" dirty="0" smtClean="0"/>
+              <a:t>A Voir !</a:t>
+            </a:r>
+            <a:endParaRPr lang="fr-FR" dirty="0"/>
+          </a:p>
+        </p:txBody>
+      </p:sp>
+      <p:sp>
+        <p:nvSpPr>
+          <p:cNvPr id="4" name="Espace réservé du numéro de diapositive 3"/>
+          <p:cNvSpPr>
+            <a:spLocks noGrp="1"/>
+          </p:cNvSpPr>
+          <p:nvPr>
+            <p:ph type="sldNum" sz="quarter" idx="12"/>
+          </p:nvPr>
+        </p:nvSpPr>
+        <p:spPr/>
+        <p:txBody>
+          <a:bodyPr/>
+          <a:lstStyle/>
+          <a:p>
+            <a:fld id="{6816B381-CB31-4B8E-B307-29C9C96A0920}" type="slidenum">
+              <a:rPr lang="fr-FR" smtClean="0"/>
+              <a:pPr/>
+              <a:t>14</a:t>
+            </a:fld>
+            <a:endParaRPr lang="fr-FR"/>
+          </a:p>
+        </p:txBody>
+      </p:sp>
+      <p:sp>
+        <p:nvSpPr>
+          <p:cNvPr id="5" name="Rectangle à coins arrondis 4"/>
+          <p:cNvSpPr/>
+          <p:nvPr/>
+        </p:nvSpPr>
+        <p:spPr>
+          <a:xfrm>
+            <a:off x="251520" y="548680"/>
+            <a:ext cx="7524328" cy="504056"/>
+          </a:xfrm>
+          <a:prstGeom prst="roundRect">
+            <a:avLst/>
+          </a:prstGeom>
+          <a:solidFill>
+            <a:schemeClr val="bg1"/>
+          </a:solidFill>
+          <a:ln w="38100">
+            <a:solidFill>
+              <a:schemeClr val="tx1"/>
+            </a:solidFill>
+          </a:ln>
+        </p:spPr>
+        <p:style>
+          <a:lnRef idx="2">
+            <a:schemeClr val="accent1">
+              <a:shade val="50000"/>
+            </a:schemeClr>
+          </a:lnRef>
+          <a:fillRef idx="1">
+            <a:schemeClr val="accent1"/>
+          </a:fillRef>
+          <a:effectRef idx="0">
+            <a:schemeClr val="accent1"/>
+          </a:effectRef>
+          <a:fontRef idx="minor">
+            <a:schemeClr val="lt1"/>
+          </a:fontRef>
+        </p:style>
+        <p:txBody>
+          <a:bodyPr rtlCol="0" anchor="ctr"/>
+          <a:lstStyle/>
+          <a:p>
+            <a:r>
+              <a:rPr lang="fr-FR" sz="2000" b="1" dirty="0">
+                <a:solidFill>
+                  <a:srgbClr val="002060"/>
+                </a:solidFill>
+              </a:rPr>
+              <a:t>Prévention des failles de sécurité</a:t>
+            </a:r>
+            <a:endParaRPr lang="fr-FR" sz="2000" b="1" dirty="0">
+              <a:solidFill>
+                <a:srgbClr val="002060"/>
+              </a:solidFill>
+            </a:endParaRPr>
+          </a:p>
+        </p:txBody>
+      </p:sp>
+    </p:spTree>
+    <p:extLst>
+      <p:ext uri="{BB962C8B-B14F-4D97-AF65-F5344CB8AC3E}">
+        <p14:creationId xmlns:p14="http://schemas.microsoft.com/office/powerpoint/2010/main" val="2931599380"/>
+      </p:ext>
+    </p:extLst>
+  </p:cSld>
+  <p:clrMapOvr>
+    <a:masterClrMapping/>
+  </p:clrMapOvr>
+  <p:timing>
+    <p:tnLst>
+      <p:par>
+        <p:cTn id="1" dur="indefinite" restart="never" nodeType="tmRoot"/>
+      </p:par>
+    </p:tnLst>
+  </p:timing>
+</p:sld>
+</file>
+
+<file path=ppt/slides/slide15.xml><?xml version="1.0" encoding="utf-8"?>
+<p:sld xmlns:a="http://schemas.openxmlformats.org/drawingml/2006/main" xmlns:r="http://schemas.openxmlformats.org/officeDocument/2006/relationships" xmlns:p="http://schemas.openxmlformats.org/presentationml/2006/main">
+  <p:cSld>
+    <p:spTree>
+      <p:nvGrpSpPr>
+        <p:cNvPr id="1" name=""/>
+        <p:cNvGrpSpPr/>
+        <p:nvPr/>
+      </p:nvGrpSpPr>
+      <p:grpSpPr>
+        <a:xfrm>
+          <a:off x="0" y="0"/>
+          <a:ext cx="0" cy="0"/>
+          <a:chOff x="0" y="0"/>
+          <a:chExt cx="0" cy="0"/>
+        </a:xfrm>
+      </p:grpSpPr>
+      <p:sp>
+        <p:nvSpPr>
+          <p:cNvPr id="4" name="Espace réservé du numéro de diapositive 3"/>
+          <p:cNvSpPr>
+            <a:spLocks noGrp="1"/>
+          </p:cNvSpPr>
+          <p:nvPr>
+            <p:ph type="sldNum" sz="quarter" idx="12"/>
+          </p:nvPr>
+        </p:nvSpPr>
+        <p:spPr/>
+        <p:txBody>
+          <a:bodyPr/>
+          <a:lstStyle/>
+          <a:p>
+            <a:fld id="{6816B381-CB31-4B8E-B307-29C9C96A0920}" type="slidenum">
+              <a:rPr lang="fr-FR" smtClean="0"/>
+              <a:pPr/>
+              <a:t>15</a:t>
+            </a:fld>
+            <a:endParaRPr lang="fr-FR"/>
+          </a:p>
+        </p:txBody>
+      </p:sp>
+      <p:sp>
+        <p:nvSpPr>
+          <p:cNvPr id="5" name="Rectangle à coins arrondis 4"/>
+          <p:cNvSpPr/>
+          <p:nvPr/>
+        </p:nvSpPr>
+        <p:spPr>
+          <a:xfrm>
+            <a:off x="251520" y="3140968"/>
+            <a:ext cx="8640960" cy="936104"/>
+          </a:xfrm>
+          <a:prstGeom prst="roundRect">
+            <a:avLst/>
+          </a:prstGeom>
+          <a:solidFill>
+            <a:schemeClr val="bg1"/>
+          </a:solidFill>
+          <a:ln w="57150">
+            <a:solidFill>
+              <a:schemeClr val="tx1"/>
+            </a:solidFill>
+          </a:ln>
+        </p:spPr>
+        <p:style>
+          <a:lnRef idx="2">
+            <a:schemeClr val="accent1">
+              <a:shade val="50000"/>
+            </a:schemeClr>
+          </a:lnRef>
+          <a:fillRef idx="1">
+            <a:schemeClr val="accent1"/>
+          </a:fillRef>
+          <a:effectRef idx="0">
+            <a:schemeClr val="accent1"/>
+          </a:effectRef>
+          <a:fontRef idx="minor">
+            <a:schemeClr val="lt1"/>
+          </a:fontRef>
+        </p:style>
+        <p:txBody>
+          <a:bodyPr rtlCol="0" anchor="ctr"/>
+          <a:lstStyle/>
+          <a:p>
+            <a:pPr algn="ctr"/>
+            <a:r>
+              <a:rPr lang="fr-FR" sz="3600" b="1" dirty="0">
+                <a:solidFill>
+                  <a:srgbClr val="002060"/>
+                </a:solidFill>
+              </a:rPr>
+              <a:t>Conclusion</a:t>
+            </a:r>
+            <a:endParaRPr lang="fr-FR" sz="3500" b="1" dirty="0">
+              <a:solidFill>
+                <a:srgbClr val="002060"/>
+              </a:solidFill>
+              <a:latin typeface="+mj-lt"/>
+            </a:endParaRPr>
+          </a:p>
+        </p:txBody>
+      </p:sp>
+    </p:spTree>
+    <p:extLst>
+      <p:ext uri="{BB962C8B-B14F-4D97-AF65-F5344CB8AC3E}">
+        <p14:creationId xmlns:p14="http://schemas.microsoft.com/office/powerpoint/2010/main" val="51642217"/>
+      </p:ext>
+    </p:extLst>
+  </p:cSld>
+  <p:clrMapOvr>
+    <a:masterClrMapping/>
+  </p:clrMapOvr>
+  <p:timing>
+    <p:tnLst>
+      <p:par>
+        <p:cTn id="1" dur="indefinite" restart="never" nodeType="tmRoot"/>
+      </p:par>
+    </p:tnLst>
+  </p:timing>
+</p:sld>
+</file>
+
+<file path=ppt/slides/slide16.xml><?xml version="1.0" encoding="utf-8"?>
+<p:sld xmlns:a="http://schemas.openxmlformats.org/drawingml/2006/main" xmlns:r="http://schemas.openxmlformats.org/officeDocument/2006/relationships" xmlns:p="http://schemas.openxmlformats.org/presentationml/2006/main">
+  <p:cSld>
+    <p:spTree>
+      <p:nvGrpSpPr>
+        <p:cNvPr id="1" name=""/>
+        <p:cNvGrpSpPr/>
+        <p:nvPr/>
+      </p:nvGrpSpPr>
+      <p:grpSpPr>
+        <a:xfrm>
+          <a:off x="0" y="0"/>
+          <a:ext cx="0" cy="0"/>
+          <a:chOff x="0" y="0"/>
+          <a:chExt cx="0" cy="0"/>
+        </a:xfrm>
+      </p:grpSpPr>
+      <p:sp>
+        <p:nvSpPr>
+          <p:cNvPr id="6" name="Espace réservé du contenu 5"/>
+          <p:cNvSpPr>
+            <a:spLocks noGrp="1"/>
+          </p:cNvSpPr>
+          <p:nvPr>
+            <p:ph idx="1"/>
+          </p:nvPr>
+        </p:nvSpPr>
+        <p:spPr>
+          <a:xfrm>
+            <a:off x="457200" y="1196752"/>
+            <a:ext cx="8229600" cy="5377784"/>
+          </a:xfrm>
+        </p:spPr>
+        <p:txBody>
+          <a:bodyPr/>
+          <a:lstStyle/>
+          <a:p>
+            <a:endParaRPr lang="fr-FR" dirty="0"/>
+          </a:p>
+        </p:txBody>
+      </p:sp>
+      <p:sp>
+        <p:nvSpPr>
+          <p:cNvPr id="4" name="Espace réservé du numéro de diapositive 3"/>
+          <p:cNvSpPr>
+            <a:spLocks noGrp="1"/>
+          </p:cNvSpPr>
+          <p:nvPr>
+            <p:ph type="sldNum" sz="quarter" idx="12"/>
+          </p:nvPr>
+        </p:nvSpPr>
+        <p:spPr/>
+        <p:txBody>
+          <a:bodyPr/>
+          <a:lstStyle/>
+          <a:p>
+            <a:fld id="{6816B381-CB31-4B8E-B307-29C9C96A0920}" type="slidenum">
+              <a:rPr lang="fr-FR" smtClean="0"/>
+              <a:pPr/>
+              <a:t>16</a:t>
             </a:fld>
             <a:endParaRPr lang="fr-FR"/>
           </a:p>
@@ -5287,6 +6316,13 @@
   <p:clrMapOvr>
     <a:masterClrMapping/>
   </p:clrMapOvr>
+  <p:timing>
+    <p:tnLst>
+      <p:par>
+        <p:cTn id="1" dur="indefinite" restart="never" nodeType="tmRoot"/>
+      </p:par>
+    </p:tnLst>
+  </p:timing>
 </p:sld>
 </file>
 
@@ -5411,11 +6447,7 @@
             </a:r>
             <a:r>
               <a:rPr lang="fr-FR" sz="1900" dirty="0" smtClean="0"/>
-              <a:t>  </a:t>
-            </a:r>
-            <a:r>
-              <a:rPr lang="fr-FR" sz="1900" dirty="0" err="1" smtClean="0"/>
-              <a:t>Phonegap</a:t>
+              <a:t>  Phonegap</a:t>
             </a:r>
             <a:endParaRPr lang="fr-FR" sz="1900" dirty="0"/>
           </a:p>
@@ -5447,33 +6479,6 @@
               <a:buNone/>
             </a:pPr>
             <a:r>
-              <a:rPr lang="fr-FR" sz="500" dirty="0" smtClean="0"/>
-              <a:t>	 </a:t>
-            </a:r>
-            <a:r>
-              <a:rPr lang="fr-FR" sz="1900" dirty="0" smtClean="0"/>
-              <a:t>	</a:t>
-            </a:r>
-            <a:r>
-              <a:rPr lang="fr-FR" sz="1900" dirty="0">
-                <a:sym typeface="Wingdings" pitchFamily="2" charset="2"/>
-              </a:rPr>
-              <a:t></a:t>
-            </a:r>
-            <a:r>
-              <a:rPr lang="fr-FR" sz="1900" dirty="0"/>
-              <a:t>  Partie </a:t>
-            </a:r>
-            <a:r>
-              <a:rPr lang="fr-FR" sz="1900" dirty="0" smtClean="0"/>
-              <a:t>serveur</a:t>
-            </a:r>
-          </a:p>
-          <a:p>
-            <a:pPr marL="681228" indent="-571500">
-              <a:buNone/>
-            </a:pPr>
-            <a:r>
               <a:rPr lang="fr-FR" sz="1900" dirty="0" smtClean="0">
                 <a:sym typeface="Wingdings" pitchFamily="2" charset="2"/>
               </a:rPr>
@@ -5485,11 +6490,39 @@
             </a:r>
             <a:r>
               <a:rPr lang="fr-FR" sz="1900" dirty="0"/>
-              <a:t>Partie c</a:t>
+              <a:t>Partie client</a:t>
+            </a:r>
+            <a:r>
+              <a:rPr lang="fr-FR" sz="1900" dirty="0"/>
+              <a:t>	 </a:t>
             </a:r>
             <a:r>
               <a:rPr lang="fr-FR" sz="1900" dirty="0" smtClean="0"/>
-              <a:t>lient</a:t>
+              <a:t>	</a:t>
+            </a:r>
+            <a:endParaRPr lang="fr-FR" sz="1900" dirty="0" smtClean="0"/>
+          </a:p>
+          <a:p>
+            <a:pPr marL="681228" indent="-571500">
+              <a:buNone/>
+            </a:pPr>
+            <a:r>
+              <a:rPr lang="fr-FR" sz="1900" dirty="0" smtClean="0">
+                <a:sym typeface="Wingdings" pitchFamily="2" charset="2"/>
+              </a:rPr>
+              <a:t>              </a:t>
+            </a:r>
+            <a:r>
+              <a:rPr lang="fr-FR" sz="1900" dirty="0" smtClean="0"/>
+              <a:t>  </a:t>
+            </a:r>
+            <a:r>
+              <a:rPr lang="fr-FR" sz="1900" dirty="0"/>
+              <a:t>Partie </a:t>
+            </a:r>
+            <a:r>
+              <a:rPr lang="fr-FR" sz="1900" dirty="0" smtClean="0"/>
+              <a:t>serveur</a:t>
             </a:r>
           </a:p>
           <a:p>
@@ -5532,7 +6565,23 @@
                   <a:srgbClr val="002060"/>
                 </a:solidFill>
               </a:rPr>
-              <a:t>      Prévention des failles de sécurité </a:t>
+              <a:t>      Prévention </a:t>
+            </a:r>
+            <a:r>
+              <a:rPr lang="fr-FR" sz="2200" b="1" dirty="0" smtClean="0">
+                <a:solidFill>
+                  <a:srgbClr val="002060"/>
+                </a:solidFill>
+              </a:rPr>
+              <a:t>contre les failles </a:t>
+            </a:r>
+            <a:r>
+              <a:rPr lang="fr-FR" sz="2200" b="1" dirty="0" smtClean="0">
+                <a:solidFill>
+                  <a:srgbClr val="002060"/>
+                </a:solidFill>
+              </a:rPr>
+              <a:t>de sécurité </a:t>
             </a:r>
           </a:p>
           <a:p>
@@ -5849,25 +6898,7 @@
                 </a:solidFill>
                 <a:sym typeface="Wingdings" pitchFamily="2" charset="2"/>
               </a:rPr>
-              <a:t> </a:t>
-            </a:r>
-            <a:r>
-              <a:rPr lang="fr-FR" sz="3600" b="1" dirty="0" smtClean="0">
-                <a:solidFill>
-                  <a:srgbClr val="002060"/>
-                </a:solidFill>
-                <a:sym typeface="Wingdings" pitchFamily="2" charset="2"/>
-              </a:rPr>
-              <a:t>les  </a:t>
-            </a:r>
-            <a:r>
-              <a:rPr lang="fr-FR" sz="3600" b="1" dirty="0" smtClean="0">
-                <a:solidFill>
-                  <a:srgbClr val="002060"/>
-                </a:solidFill>
-                <a:sym typeface="Wingdings" pitchFamily="2" charset="2"/>
-              </a:rPr>
-              <a:t>outils  </a:t>
+              <a:t> les  outils  </a:t>
             </a:r>
             <a:r>
               <a:rPr lang="fr-FR" sz="3600" b="1" dirty="0">
@@ -5986,15 +7017,11 @@
             </a:pPr>
             <a:r>
               <a:rPr lang="fr-FR" dirty="0" smtClean="0"/>
-              <a:t>Eventuellement lancer une recherche sur les moteurs de recherches des numéros de téléphones, en cas d’</a:t>
-            </a:r>
-            <a:r>
-              <a:rPr lang="fr-FR" dirty="0" err="1" smtClean="0"/>
-              <a:t>echeance</a:t>
+              <a:t>Eventuellement lancer une recherche sur les moteurs de recherches des numéros de téléphones, en cas </a:t>
             </a:r>
             <a:r>
               <a:rPr lang="fr-FR" dirty="0"/>
-              <a:t>.</a:t>
+              <a:t>d'échéance.</a:t>
             </a:r>
             <a:endParaRPr lang="fr-FR" dirty="0"/>
           </a:p>
@@ -6303,23 +7330,8 @@
                 </a:solidFill>
                 <a:sym typeface="Wingdings" pitchFamily="2" charset="2"/>
               </a:rPr>
-              <a:t>Recevoir un appel avec </a:t>
-            </a:r>
-            <a:r>
-              <a:rPr lang="fr-FR" sz="2200" b="1" dirty="0" smtClean="0">
-                <a:solidFill>
-                  <a:schemeClr val="bg1"/>
-                </a:solidFill>
-                <a:sym typeface="Wingdings" pitchFamily="2" charset="2"/>
-              </a:rPr>
-              <a:t>un numéro inconnu</a:t>
-            </a:r>
-            <a:endParaRPr lang="fr-FR" sz="2200" b="1" dirty="0" smtClean="0">
-              <a:solidFill>
-                <a:schemeClr val="bg1"/>
-              </a:solidFill>
-              <a:sym typeface="Wingdings" pitchFamily="2" charset="2"/>
-            </a:endParaRPr>
+              <a:t>Recevoir un appel avec un numéro inconnu</a:t>
+            </a:r>
           </a:p>
         </p:txBody>
       </p:sp>
@@ -6400,7 +7412,7 @@
                 </a:solidFill>
                 <a:sym typeface="Wingdings" pitchFamily="2" charset="2"/>
               </a:rPr>
-              <a:t>Lancer une recherche dans tous mes mails reçus pour afficher </a:t>
+              <a:t>Lancer une recherche dans </a:t>
             </a:r>
             <a:r>
               <a:rPr lang="fr-FR" sz="2200" b="1" dirty="0" smtClean="0">
@@ -6409,7 +7421,34 @@
                 </a:solidFill>
                 <a:sym typeface="Wingdings" pitchFamily="2" charset="2"/>
               </a:rPr>
-              <a:t>l’</a:t>
+              <a:t>toutes mes boite </a:t>
+            </a:r>
+            <a:r>
+              <a:rPr lang="fr-FR" sz="2200" b="1" dirty="0" smtClean="0">
+                <a:solidFill>
+                  <a:schemeClr val="bg1"/>
+                </a:solidFill>
+                <a:sym typeface="Wingdings" pitchFamily="2" charset="2"/>
+              </a:rPr>
+              <a:t>mails </a:t>
+            </a:r>
+            <a:r>
+              <a:rPr lang="fr-FR" sz="2200" b="1" dirty="0" smtClean="0">
+                <a:solidFill>
+                  <a:schemeClr val="bg1"/>
+                </a:solidFill>
+                <a:sym typeface="Wingdings" pitchFamily="2" charset="2"/>
+              </a:rPr>
+              <a:t>pour </a:t>
+            </a:r>
+            <a:r>
+              <a:rPr lang="fr-FR" sz="2200" b="1" dirty="0" smtClean="0">
+                <a:solidFill>
+                  <a:schemeClr val="bg1"/>
+                </a:solidFill>
+                <a:sym typeface="Wingdings" pitchFamily="2" charset="2"/>
+              </a:rPr>
+              <a:t>afficher l’</a:t>
             </a:r>
             <a:r>
               <a:rPr lang="fr-FR" sz="2200" b="1" dirty="0">
@@ -6427,16 +7466,7 @@
                 </a:solidFill>
                 <a:sym typeface="Wingdings" pitchFamily="2" charset="2"/>
               </a:rPr>
-              <a:t>ventuelle </a:t>
-            </a:r>
-            <a:r>
-              <a:rPr lang="fr-FR" sz="2200" b="1" dirty="0" smtClean="0">
-                <a:solidFill>
-                  <a:schemeClr val="bg1"/>
-                </a:solidFill>
-                <a:sym typeface="Wingdings" pitchFamily="2" charset="2"/>
-              </a:rPr>
-              <a:t>l’identité de l’appelant</a:t>
+              <a:t>ventuelle l’identité de l’appelant</a:t>
             </a:r>
             <a:endParaRPr lang="fr-FR" sz="2000" b="1" dirty="0" smtClean="0">
               <a:solidFill>
@@ -6500,43 +7530,7 @@
                 </a:solidFill>
                 <a:sym typeface="Wingdings" pitchFamily="2" charset="2"/>
               </a:rPr>
-              <a:t>Probablement  c’est un contact </a:t>
-            </a:r>
-            <a:r>
-              <a:rPr lang="fr-FR" sz="2200" b="1" dirty="0" smtClean="0">
-                <a:solidFill>
-                  <a:schemeClr val="bg1"/>
-                </a:solidFill>
-                <a:sym typeface="Wingdings" pitchFamily="2" charset="2"/>
-              </a:rPr>
-              <a:t>que j’ai </a:t>
-            </a:r>
-            <a:r>
-              <a:rPr lang="fr-FR" sz="2200" b="1" dirty="0" smtClean="0">
-                <a:solidFill>
-                  <a:schemeClr val="bg1"/>
-                </a:solidFill>
-                <a:sym typeface="Wingdings" pitchFamily="2" charset="2"/>
-              </a:rPr>
-              <a:t>eu un échange  </a:t>
-            </a:r>
-            <a:r>
-              <a:rPr lang="fr-FR" sz="2200" b="1" dirty="0" smtClean="0">
-                <a:solidFill>
-                  <a:schemeClr val="bg1"/>
-                </a:solidFill>
-                <a:sym typeface="Wingdings" pitchFamily="2" charset="2"/>
-              </a:rPr>
-              <a:t>mail </a:t>
-            </a:r>
-            <a:r>
-              <a:rPr lang="fr-FR" sz="2200" b="1" dirty="0" smtClean="0">
-                <a:solidFill>
-                  <a:schemeClr val="bg1"/>
-                </a:solidFill>
-                <a:sym typeface="Wingdings" pitchFamily="2" charset="2"/>
-              </a:rPr>
-              <a:t>dernièrement </a:t>
+              <a:t>Probablement  c’est un contact que j’ai eu un échange  mail dernièrement </a:t>
             </a:r>
             <a:endParaRPr lang="fr-FR" sz="2200" b="1" dirty="0">
               <a:solidFill>
@@ -6872,8 +7866,12 @@
           <a:p>
             <a:pPr lvl="1"/>
             <a:r>
+              <a:rPr lang="fr-FR" dirty="0" smtClean="0"/>
+              <a:t>Phonegap-</a:t>
+            </a:r>
+            <a:r>
               <a:rPr lang="fr-FR" dirty="0" err="1" smtClean="0"/>
-              <a:t>Phonegap</a:t>
+              <a:t>Android</a:t>
             </a:r>
             <a:endParaRPr lang="fr-FR" dirty="0" smtClean="0"/>
           </a:p>
@@ -6884,8 +7882,12 @@
               <a:t>Serveur web : </a:t>
             </a:r>
             <a:r>
+              <a:rPr lang="fr-FR" dirty="0" smtClean="0"/>
+              <a:t>apache , </a:t>
+            </a:r>
+            <a:r>
               <a:rPr lang="fr-FR" dirty="0" err="1" smtClean="0"/>
-              <a:t>appache</a:t>
+              <a:t>WampServer</a:t>
             </a:r>
             <a:endParaRPr lang="fr-FR" dirty="0" smtClean="0"/>
           </a:p>
@@ -6945,6 +7947,13 @@
   <p:clrMapOvr>
     <a:masterClrMapping/>
   </p:clrMapOvr>
+  <p:timing>
+    <p:tnLst>
+      <p:par>
+        <p:cTn id="1" dur="indefinite" restart="never" nodeType="tmRoot"/>
+      </p:par>
+    </p:tnLst>
+  </p:timing>
 </p:sld>
 </file>
 
@@ -7110,6 +8119,246 @@
           </a:p>
         </p:txBody>
       </p:sp>
+      <p:sp>
+        <p:nvSpPr>
+          <p:cNvPr id="5" name="Rectangle à coins arrondis 4"/>
+          <p:cNvSpPr/>
+          <p:nvPr/>
+        </p:nvSpPr>
+        <p:spPr>
+          <a:xfrm>
+            <a:off x="72008" y="548680"/>
+            <a:ext cx="7524328" cy="504056"/>
+          </a:xfrm>
+          <a:prstGeom prst="roundRect">
+            <a:avLst/>
+          </a:prstGeom>
+          <a:solidFill>
+            <a:schemeClr val="bg1"/>
+          </a:solidFill>
+          <a:ln w="38100">
+            <a:solidFill>
+              <a:schemeClr val="tx1"/>
+            </a:solidFill>
+          </a:ln>
+        </p:spPr>
+        <p:style>
+          <a:lnRef idx="2">
+            <a:schemeClr val="accent1">
+              <a:shade val="50000"/>
+            </a:schemeClr>
+          </a:lnRef>
+          <a:fillRef idx="1">
+            <a:schemeClr val="accent1"/>
+          </a:fillRef>
+          <a:effectRef idx="0">
+            <a:schemeClr val="accent1"/>
+          </a:effectRef>
+          <a:fontRef idx="minor">
+            <a:schemeClr val="lt1"/>
+          </a:fontRef>
+        </p:style>
+        <p:txBody>
+          <a:bodyPr rtlCol="0" anchor="ctr"/>
+          <a:lstStyle/>
+          <a:p>
+            <a:r>
+              <a:rPr lang="fr-FR" sz="2000" b="1" dirty="0">
+                <a:solidFill>
+                  <a:srgbClr val="002060"/>
+                </a:solidFill>
+              </a:rPr>
+              <a:t>Architecture générale de l’application</a:t>
+            </a:r>
+          </a:p>
+        </p:txBody>
+      </p:sp>
+      <p:sp>
+        <p:nvSpPr>
+          <p:cNvPr id="6" name="Rectangle à coins arrondis 5"/>
+          <p:cNvSpPr/>
+          <p:nvPr/>
+        </p:nvSpPr>
+        <p:spPr>
+          <a:xfrm>
+            <a:off x="107504" y="1196752"/>
+            <a:ext cx="1944216" cy="432048"/>
+          </a:xfrm>
+          <a:prstGeom prst="roundRect">
+            <a:avLst/>
+          </a:prstGeom>
+          <a:solidFill>
+            <a:schemeClr val="bg1"/>
+          </a:solidFill>
+          <a:ln w="38100">
+            <a:solidFill>
+              <a:schemeClr val="accent6">
+                <a:lumMod val="60000"/>
+                <a:lumOff val="40000"/>
+              </a:schemeClr>
+            </a:solidFill>
+          </a:ln>
+        </p:spPr>
+        <p:style>
+          <a:lnRef idx="2">
+            <a:schemeClr val="accent1">
+              <a:shade val="50000"/>
+            </a:schemeClr>
+          </a:lnRef>
+          <a:fillRef idx="1">
+            <a:schemeClr val="accent1"/>
+          </a:fillRef>
+          <a:effectRef idx="0">
+            <a:schemeClr val="accent1"/>
+          </a:effectRef>
+          <a:fontRef idx="minor">
+            <a:schemeClr val="lt1"/>
+          </a:fontRef>
+        </p:style>
+        <p:txBody>
+          <a:bodyPr rtlCol="0" anchor="ctr"/>
+          <a:lstStyle/>
+          <a:p>
+            <a:r>
+              <a:rPr lang="fr-FR" sz="2400" dirty="0">
+                <a:solidFill>
+                  <a:schemeClr val="accent2">
+                    <a:lumMod val="75000"/>
+                  </a:schemeClr>
+                </a:solidFill>
+              </a:rPr>
+              <a:t>Partie client</a:t>
+            </a:r>
+            <a:endParaRPr lang="fr-FR" sz="2200" b="1" dirty="0">
+              <a:solidFill>
+                <a:schemeClr val="accent2">
+                  <a:lumMod val="75000"/>
+                </a:schemeClr>
+              </a:solidFill>
+            </a:endParaRPr>
+          </a:p>
+        </p:txBody>
+      </p:sp>
+      <p:pic>
+        <p:nvPicPr>
+          <p:cNvPr id="3" name="Image 2"/>
+          <p:cNvPicPr>
+            <a:picLocks noChangeAspect="1"/>
+          </p:cNvPicPr>
+          <p:nvPr/>
+        </p:nvPicPr>
+        <p:blipFill>
+          <a:blip r:embed="rId2">
+            <a:extLst>
+              <a:ext uri="{28A0092B-C50C-407E-A947-70E740481C1C}">
+                <a14:useLocalDpi xmlns:a14="http://schemas.microsoft.com/office/drawing/2010/main" val="0"/>
+              </a:ext>
+            </a:extLst>
+          </a:blip>
+          <a:stretch>
+            <a:fillRect/>
+          </a:stretch>
+        </p:blipFill>
+        <p:spPr>
+          <a:xfrm>
+            <a:off x="899592" y="1844824"/>
+            <a:ext cx="3048426" cy="4572638"/>
+          </a:xfrm>
+          <a:prstGeom prst="rect">
+            <a:avLst/>
+          </a:prstGeom>
+        </p:spPr>
+      </p:pic>
+      <p:pic>
+        <p:nvPicPr>
+          <p:cNvPr id="7" name="Image 6"/>
+          <p:cNvPicPr>
+            <a:picLocks noChangeAspect="1"/>
+          </p:cNvPicPr>
+          <p:nvPr/>
+        </p:nvPicPr>
+        <p:blipFill>
+          <a:blip r:embed="rId3">
+            <a:extLst>
+              <a:ext uri="{28A0092B-C50C-407E-A947-70E740481C1C}">
+                <a14:useLocalDpi xmlns:a14="http://schemas.microsoft.com/office/drawing/2010/main" val="0"/>
+              </a:ext>
+            </a:extLst>
+          </a:blip>
+          <a:stretch>
+            <a:fillRect/>
+          </a:stretch>
+        </p:blipFill>
+        <p:spPr>
+          <a:xfrm>
+            <a:off x="5657976" y="2313296"/>
+            <a:ext cx="2934110" cy="504896"/>
+          </a:xfrm>
+          <a:prstGeom prst="rect">
+            <a:avLst/>
+          </a:prstGeom>
+        </p:spPr>
+      </p:pic>
+      <p:pic>
+        <p:nvPicPr>
+          <p:cNvPr id="8" name="Image 7"/>
+          <p:cNvPicPr>
+            <a:picLocks noChangeAspect="1"/>
+          </p:cNvPicPr>
+          <p:nvPr/>
+        </p:nvPicPr>
+        <p:blipFill>
+          <a:blip r:embed="rId4">
+            <a:extLst>
+              <a:ext uri="{28A0092B-C50C-407E-A947-70E740481C1C}">
+                <a14:useLocalDpi xmlns:a14="http://schemas.microsoft.com/office/drawing/2010/main" val="0"/>
+              </a:ext>
+            </a:extLst>
+          </a:blip>
+          <a:stretch>
+            <a:fillRect/>
+          </a:stretch>
+        </p:blipFill>
+        <p:spPr>
+          <a:xfrm>
+            <a:off x="5604455" y="3717032"/>
+            <a:ext cx="2934110" cy="504896"/>
+          </a:xfrm>
+          <a:prstGeom prst="rect">
+            <a:avLst/>
+          </a:prstGeom>
+        </p:spPr>
+      </p:pic>
+      <p:pic>
+        <p:nvPicPr>
+          <p:cNvPr id="9" name="Image 8"/>
+          <p:cNvPicPr>
+            <a:picLocks noChangeAspect="1"/>
+          </p:cNvPicPr>
+          <p:nvPr/>
+        </p:nvPicPr>
+        <p:blipFill>
+          <a:blip r:embed="rId5">
+            <a:extLst>
+              <a:ext uri="{28A0092B-C50C-407E-A947-70E740481C1C}">
+                <a14:useLocalDpi xmlns:a14="http://schemas.microsoft.com/office/drawing/2010/main" val="0"/>
+              </a:ext>
+            </a:extLst>
+          </a:blip>
+          <a:stretch>
+            <a:fillRect/>
+          </a:stretch>
+        </p:blipFill>
+        <p:spPr>
+          <a:xfrm>
+            <a:off x="5652120" y="4943713"/>
+            <a:ext cx="2934110" cy="504896"/>
+          </a:xfrm>
+          <a:prstGeom prst="rect">
+            <a:avLst/>
+          </a:prstGeom>
+        </p:spPr>
+      </p:pic>
     </p:spTree>
     <p:extLst>
       <p:ext uri="{BB962C8B-B14F-4D97-AF65-F5344CB8AC3E}">
@@ -7120,6 +8369,276 @@
   <p:clrMapOvr>
     <a:masterClrMapping/>
   </p:clrMapOvr>
+  <p:timing>
+    <p:tnLst>
+      <p:par>
+        <p:cTn id="1" dur="indefinite" restart="never" nodeType="tmRoot">
+          <p:childTnLst>
+            <p:seq concurrent="1" nextAc="seek">
+              <p:cTn id="2" dur="indefinite" nodeType="mainSeq">
+                <p:childTnLst>
+                  <p:par>
+                    <p:cTn id="3" fill="hold">
+                      <p:stCondLst>
+                        <p:cond delay="indefinite"/>
+                        <p:cond evt="onBegin" delay="0">
+                          <p:tn val="2"/>
+                        </p:cond>
+                      </p:stCondLst>
+                      <p:childTnLst>
+                        <p:par>
+                          <p:cTn id="4" fill="hold">
+                            <p:stCondLst>
+                              <p:cond delay="0"/>
+                            </p:stCondLst>
+                            <p:childTnLst>
+                              <p:par>
+                                <p:cTn id="5" presetID="2" presetClass="entr" presetSubtype="8" fill="hold" nodeType="afterEffect">
+                                  <p:stCondLst>
+                                    <p:cond delay="0"/>
+                                  </p:stCondLst>
+                                  <p:childTnLst>
+                                    <p:set>
+                                      <p:cBhvr>
+                                        <p:cTn id="6" dur="1" fill="hold">
+                                          <p:stCondLst>
+                                            <p:cond delay="0"/>
+                                          </p:stCondLst>
+                                        </p:cTn>
+                                        <p:tgtEl>
+                                          <p:spTgt spid="7"/>
+                                        </p:tgtEl>
+                                        <p:attrNameLst>
+                                          <p:attrName>style.visibility</p:attrName>
+                                        </p:attrNameLst>
+                                      </p:cBhvr>
+                                      <p:to>
+                                        <p:strVal val="visible"/>
+                                      </p:to>
+                                    </p:set>
+                                    <p:anim calcmode="lin" valueType="num">
+                                      <p:cBhvr additive="base">
+                                        <p:cTn id="7" dur="500" fill="hold"/>
+                                        <p:tgtEl>
+                                          <p:spTgt spid="7"/>
+                                        </p:tgtEl>
+                                        <p:attrNameLst>
+                                          <p:attrName>ppt_x</p:attrName>
+                                        </p:attrNameLst>
+                                      </p:cBhvr>
+                                      <p:tavLst>
+                                        <p:tav tm="0">
+                                          <p:val>
+                                            <p:strVal val="0-#ppt_w/2"/>
+                                          </p:val>
+                                        </p:tav>
+                                        <p:tav tm="100000">
+                                          <p:val>
+                                            <p:strVal val="#ppt_x"/>
+                                          </p:val>
+                                        </p:tav>
+                                      </p:tavLst>
+                                    </p:anim>
+                                    <p:anim calcmode="lin" valueType="num">
+                                      <p:cBhvr additive="base">
+                                        <p:cTn id="8" dur="500" fill="hold"/>
+                                        <p:tgtEl>
+                                          <p:spTgt spid="7"/>
+                                        </p:tgtEl>
+                                        <p:attrNameLst>
+                                          <p:attrName>ppt_y</p:attrName>
+                                        </p:attrNameLst>
+                                      </p:cBhvr>
+                                      <p:tavLst>
+                                        <p:tav tm="0">
+                                          <p:val>
+                                            <p:strVal val="#ppt_y"/>
+                                          </p:val>
+                                        </p:tav>
+                                        <p:tav tm="100000">
+                                          <p:val>
+                                            <p:strVal val="#ppt_y"/>
+                                          </p:val>
+                                        </p:tav>
+                                      </p:tavLst>
+                                    </p:anim>
+                                  </p:childTnLst>
+                                </p:cTn>
+                              </p:par>
+                              <p:par>
+                                <p:cTn id="9" presetID="2" presetClass="entr" presetSubtype="8" fill="hold" nodeType="withEffect">
+                                  <p:stCondLst>
+                                    <p:cond delay="0"/>
+                                  </p:stCondLst>
+                                  <p:childTnLst>
+                                    <p:set>
+                                      <p:cBhvr>
+                                        <p:cTn id="10" dur="1" fill="hold">
+                                          <p:stCondLst>
+                                            <p:cond delay="0"/>
+                                          </p:stCondLst>
+                                        </p:cTn>
+                                        <p:tgtEl>
+                                          <p:spTgt spid="8"/>
+                                        </p:tgtEl>
+                                        <p:attrNameLst>
+                                          <p:attrName>style.visibility</p:attrName>
+                                        </p:attrNameLst>
+                                      </p:cBhvr>
+                                      <p:to>
+                                        <p:strVal val="visible"/>
+                                      </p:to>
+                                    </p:set>
+                                    <p:anim calcmode="lin" valueType="num">
+                                      <p:cBhvr additive="base">
+                                        <p:cTn id="11" dur="500" fill="hold"/>
+                                        <p:tgtEl>
+                                          <p:spTgt spid="8"/>
+                                        </p:tgtEl>
+                                        <p:attrNameLst>
+                                          <p:attrName>ppt_x</p:attrName>
+                                        </p:attrNameLst>
+                                      </p:cBhvr>
+                                      <p:tavLst>
+                                        <p:tav tm="0">
+                                          <p:val>
+                                            <p:strVal val="0-#ppt_w/2"/>
+                                          </p:val>
+                                        </p:tav>
+                                        <p:tav tm="100000">
+                                          <p:val>
+                                            <p:strVal val="#ppt_x"/>
+                                          </p:val>
+                                        </p:tav>
+                                      </p:tavLst>
+                                    </p:anim>
+                                    <p:anim calcmode="lin" valueType="num">
+                                      <p:cBhvr additive="base">
+                                        <p:cTn id="12" dur="500" fill="hold"/>
+                                        <p:tgtEl>
+                                          <p:spTgt spid="8"/>
+                                        </p:tgtEl>
+                                        <p:attrNameLst>
+                                          <p:attrName>ppt_y</p:attrName>
+                                        </p:attrNameLst>
+                                      </p:cBhvr>
+                                      <p:tavLst>
+                                        <p:tav tm="0">
+                                          <p:val>
+                                            <p:strVal val="#ppt_y"/>
+                                          </p:val>
+                                        </p:tav>
+                                        <p:tav tm="100000">
+                                          <p:val>
+                                            <p:strVal val="#ppt_y"/>
+                                          </p:val>
+                                        </p:tav>
+                                      </p:tavLst>
+                                    </p:anim>
+                                  </p:childTnLst>
+                                </p:cTn>
+                              </p:par>
+                              <p:par>
+                                <p:cTn id="13" presetID="2" presetClass="entr" presetSubtype="8" fill="hold" nodeType="withEffect">
+                                  <p:stCondLst>
+                                    <p:cond delay="0"/>
+                                  </p:stCondLst>
+                                  <p:childTnLst>
+                                    <p:set>
+                                      <p:cBhvr>
+                                        <p:cTn id="14" dur="1" fill="hold">
+                                          <p:stCondLst>
+                                            <p:cond delay="0"/>
+                                          </p:stCondLst>
+                                        </p:cTn>
+                                        <p:tgtEl>
+                                          <p:spTgt spid="9"/>
+                                        </p:tgtEl>
+                                        <p:attrNameLst>
+                                          <p:attrName>style.visibility</p:attrName>
+                                        </p:attrNameLst>
+                                      </p:cBhvr>
+                                      <p:to>
+                                        <p:strVal val="visible"/>
+                                      </p:to>
+                                    </p:set>
+                                    <p:anim calcmode="lin" valueType="num">
+                                      <p:cBhvr additive="base">
+                                        <p:cTn id="15" dur="500" fill="hold"/>
+                                        <p:tgtEl>
+                                          <p:spTgt spid="9"/>
+                                        </p:tgtEl>
+                                        <p:attrNameLst>
+                                          <p:attrName>ppt_x</p:attrName>
+                                        </p:attrNameLst>
+                                      </p:cBhvr>
+                                      <p:tavLst>
+                                        <p:tav tm="0">
+                                          <p:val>
+                                            <p:strVal val="0-#ppt_w/2"/>
+                                          </p:val>
+                                        </p:tav>
+                                        <p:tav tm="100000">
+                                          <p:val>
+                                            <p:strVal val="#ppt_x"/>
+                                          </p:val>
+                                        </p:tav>
+                                      </p:tavLst>
+                                    </p:anim>
+                                    <p:anim calcmode="lin" valueType="num">
+                                      <p:cBhvr additive="base">
+                                        <p:cTn id="16" dur="500" fill="hold"/>
+                                        <p:tgtEl>
+                                          <p:spTgt spid="9"/>
+                                        </p:tgtEl>
+                                        <p:attrNameLst>
+                                          <p:attrName>ppt_y</p:attrName>
+                                        </p:attrNameLst>
+                                      </p:cBhvr>
+                                      <p:tavLst>
+                                        <p:tav tm="0">
+                                          <p:val>
+                                            <p:strVal val="#ppt_y"/>
+                                          </p:val>
+                                        </p:tav>
+                                        <p:tav tm="100000">
+                                          <p:val>
+                                            <p:strVal val="#ppt_y"/>
+                                          </p:val>
+                                        </p:tav>
+                                      </p:tavLst>
+                                    </p:anim>
+                                  </p:childTnLst>
+                                </p:cTn>
+                              </p:par>
+                            </p:childTnLst>
+                          </p:cTn>
+                        </p:par>
+                      </p:childTnLst>
+                    </p:cTn>
+                  </p:par>
+                </p:childTnLst>
+              </p:cTn>
+              <p:prevCondLst>
+                <p:cond evt="onPrev" delay="0">
+                  <p:tgtEl>
+                    <p:sldTgt/>
+                  </p:tgtEl>
+                </p:cond>
+              </p:prevCondLst>
+              <p:nextCondLst>
+                <p:cond evt="onNext" delay="0">
+                  <p:tgtEl>
+                    <p:sldTgt/>
+                  </p:tgtEl>
+                </p:cond>
+              </p:nextCondLst>
+            </p:seq>
+          </p:childTnLst>
+        </p:cTn>
+      </p:par>
+    </p:tnLst>
+  </p:timing>
 </p:sld>
 </file>
 
@@ -7172,8 +8691,8 @@
         </p:nvSpPr>
         <p:spPr>
           <a:xfrm>
-            <a:off x="251520" y="3140968"/>
-            <a:ext cx="8640960" cy="936104"/>
+            <a:off x="72008" y="548680"/>
+            <a:ext cx="7524328" cy="504056"/>
           </a:xfrm>
           <a:prstGeom prst="roundRect">
             <a:avLst/>
@@ -7181,7 +8700,7 @@
           <a:solidFill>
             <a:schemeClr val="bg1"/>
           </a:solidFill>
-          <a:ln w="57150">
+          <a:ln w="38100">
             <a:solidFill>
               <a:schemeClr val="tx1"/>
             </a:solidFill>
@@ -7207,28 +8726,207 @@
           <a:bodyPr rtlCol="0" anchor="ctr"/>
           <a:lstStyle/>
           <a:p>
-            <a:pPr algn="ctr"/>
-            <a:r>
-              <a:rPr lang="fr-FR" sz="3600" b="1" dirty="0">
+            <a:r>
+              <a:rPr lang="fr-FR" sz="2000" b="1" dirty="0">
                 <a:solidFill>
                   <a:srgbClr val="002060"/>
                 </a:solidFill>
               </a:rPr>
-              <a:t>Prévention des failles de sécurité</a:t>
-            </a:r>
-            <a:endParaRPr lang="fr-FR" sz="3500" b="1" dirty="0">
+              <a:t>Architecture générale de l’application</a:t>
+            </a:r>
+          </a:p>
+        </p:txBody>
+      </p:sp>
+      <p:sp>
+        <p:nvSpPr>
+          <p:cNvPr id="6" name="Rectangle à coins arrondis 5"/>
+          <p:cNvSpPr/>
+          <p:nvPr/>
+        </p:nvSpPr>
+        <p:spPr>
+          <a:xfrm>
+            <a:off x="107504" y="1196752"/>
+            <a:ext cx="1944216" cy="432048"/>
+          </a:xfrm>
+          <a:prstGeom prst="roundRect">
+            <a:avLst/>
+          </a:prstGeom>
+          <a:solidFill>
+            <a:schemeClr val="bg1"/>
+          </a:solidFill>
+          <a:ln w="38100">
+            <a:solidFill>
+              <a:schemeClr val="accent6">
+                <a:lumMod val="60000"/>
+                <a:lumOff val="40000"/>
+              </a:schemeClr>
+            </a:solidFill>
+          </a:ln>
+        </p:spPr>
+        <p:style>
+          <a:lnRef idx="2">
+            <a:schemeClr val="accent1">
+              <a:shade val="50000"/>
+            </a:schemeClr>
+          </a:lnRef>
+          <a:fillRef idx="1">
+            <a:schemeClr val="accent1"/>
+          </a:fillRef>
+          <a:effectRef idx="0">
+            <a:schemeClr val="accent1"/>
+          </a:effectRef>
+          <a:fontRef idx="minor">
+            <a:schemeClr val="lt1"/>
+          </a:fontRef>
+        </p:style>
+        <p:txBody>
+          <a:bodyPr rtlCol="0" anchor="ctr"/>
+          <a:lstStyle/>
+          <a:p>
+            <a:r>
+              <a:rPr lang="fr-FR" sz="2400" dirty="0">
+                <a:solidFill>
+                  <a:schemeClr val="accent2">
+                    <a:lumMod val="75000"/>
+                  </a:schemeClr>
+                </a:solidFill>
+              </a:rPr>
+              <a:t>Partie client</a:t>
+            </a:r>
+            <a:endParaRPr lang="fr-FR" sz="2200" b="1" dirty="0">
               <a:solidFill>
-                <a:srgbClr val="002060"/>
+                <a:schemeClr val="accent2">
+                  <a:lumMod val="75000"/>
+                </a:schemeClr>
               </a:solidFill>
-              <a:latin typeface="+mj-lt"/>
             </a:endParaRPr>
           </a:p>
         </p:txBody>
       </p:sp>
+      <p:pic>
+        <p:nvPicPr>
+          <p:cNvPr id="7" name="Image 6"/>
+          <p:cNvPicPr>
+            <a:picLocks noChangeAspect="1"/>
+          </p:cNvPicPr>
+          <p:nvPr/>
+        </p:nvPicPr>
+        <p:blipFill>
+          <a:blip r:embed="rId3">
+            <a:extLst>
+              <a:ext uri="{28A0092B-C50C-407E-A947-70E740481C1C}">
+                <a14:useLocalDpi xmlns:a14="http://schemas.microsoft.com/office/drawing/2010/main" val="0"/>
+              </a:ext>
+            </a:extLst>
+          </a:blip>
+          <a:stretch>
+            <a:fillRect/>
+          </a:stretch>
+        </p:blipFill>
+        <p:spPr>
+          <a:xfrm>
+            <a:off x="3033573" y="1376352"/>
+            <a:ext cx="2934110" cy="504896"/>
+          </a:xfrm>
+          <a:prstGeom prst="rect">
+            <a:avLst/>
+          </a:prstGeom>
+        </p:spPr>
+      </p:pic>
+      <p:pic>
+        <p:nvPicPr>
+          <p:cNvPr id="8" name="Image 7"/>
+          <p:cNvPicPr>
+            <a:picLocks noChangeAspect="1"/>
+          </p:cNvPicPr>
+          <p:nvPr/>
+        </p:nvPicPr>
+        <p:blipFill>
+          <a:blip r:embed="rId4">
+            <a:extLst>
+              <a:ext uri="{28A0092B-C50C-407E-A947-70E740481C1C}">
+                <a14:useLocalDpi xmlns:a14="http://schemas.microsoft.com/office/drawing/2010/main" val="0"/>
+              </a:ext>
+            </a:extLst>
+          </a:blip>
+          <a:stretch>
+            <a:fillRect/>
+          </a:stretch>
+        </p:blipFill>
+        <p:spPr>
+          <a:xfrm>
+            <a:off x="118180" y="2161788"/>
+            <a:ext cx="2583463" cy="4239217"/>
+          </a:xfrm>
+          <a:prstGeom prst="rect">
+            <a:avLst/>
+          </a:prstGeom>
+        </p:spPr>
+      </p:pic>
+      <p:pic>
+        <p:nvPicPr>
+          <p:cNvPr id="9" name="Image 8"/>
+          <p:cNvPicPr>
+            <a:picLocks noChangeAspect="1"/>
+          </p:cNvPicPr>
+          <p:nvPr/>
+        </p:nvPicPr>
+        <p:blipFill>
+          <a:blip r:embed="rId5">
+            <a:extLst>
+              <a:ext uri="{28A0092B-C50C-407E-A947-70E740481C1C}">
+                <a14:useLocalDpi xmlns:a14="http://schemas.microsoft.com/office/drawing/2010/main" val="0"/>
+              </a:ext>
+            </a:extLst>
+          </a:blip>
+          <a:stretch>
+            <a:fillRect/>
+          </a:stretch>
+        </p:blipFill>
+        <p:spPr>
+          <a:xfrm>
+            <a:off x="6156174" y="2161786"/>
+            <a:ext cx="2955665" cy="4239217"/>
+          </a:xfrm>
+          <a:prstGeom prst="rect">
+            <a:avLst/>
+          </a:prstGeom>
+        </p:spPr>
+      </p:pic>
+      <p:pic>
+        <p:nvPicPr>
+          <p:cNvPr id="10" name="Image 9"/>
+          <p:cNvPicPr>
+            <a:picLocks noChangeAspect="1"/>
+          </p:cNvPicPr>
+          <p:nvPr/>
+        </p:nvPicPr>
+        <p:blipFill>
+          <a:blip r:embed="rId6">
+            <a:extLst>
+              <a:ext uri="{28A0092B-C50C-407E-A947-70E740481C1C}">
+                <a14:useLocalDpi xmlns:a14="http://schemas.microsoft.com/office/drawing/2010/main" val="0"/>
+              </a:ext>
+            </a:extLst>
+          </a:blip>
+          <a:stretch>
+            <a:fillRect/>
+          </a:stretch>
+        </p:blipFill>
+        <p:spPr>
+          <a:xfrm>
+            <a:off x="2915816" y="2161788"/>
+            <a:ext cx="3051867" cy="4339241"/>
+          </a:xfrm>
+          <a:prstGeom prst="rect">
+            <a:avLst/>
+          </a:prstGeom>
+        </p:spPr>
+      </p:pic>
     </p:spTree>
     <p:extLst>
       <p:ext uri="{BB962C8B-B14F-4D97-AF65-F5344CB8AC3E}">
-        <p14:creationId xmlns:p14="http://schemas.microsoft.com/office/powerpoint/2010/main" val="51642217"/>
+        <p14:creationId xmlns:p14="http://schemas.microsoft.com/office/powerpoint/2010/main" val="1331703616"/>
       </p:ext>
     </p:extLst>
   </p:cSld>

</xml_diff>